<commit_message>
change title in doc files
</commit_message>
<xml_diff>
--- a/doc/K220111_Micropython Libraries 요약.pptx
+++ b/doc/K220111_Micropython Libraries 요약.pptx
@@ -19,7 +19,7 @@
     <p:sldId id="267" r:id="rId13"/>
   </p:sldIdLst>
   <p:sldSz cx="12192000" cy="6858000"/>
-  <p:notesSz cx="6858000" cy="9144000"/>
+  <p:notesSz cx="7104063" cy="10234613"/>
   <p:defaultTextStyle>
     <a:defPPr>
       <a:defRPr lang="ko-KR"/>
@@ -5734,10 +5734,10 @@
           <a:p>
             <a:r>
               <a:rPr lang="en-US" altLang="ko-KR" dirty="0" err="1" smtClean="0"/>
-              <a:t>Micropython</a:t>
-            </a:r>
-            <a:r>
-              <a:rPr lang="en-US" altLang="ko-KR" dirty="0"/>
+              <a:t>MicroPython</a:t>
+            </a:r>
+            <a:r>
+              <a:rPr lang="en-US" altLang="ko-KR" dirty="0" smtClean="0"/>
               <a:t> </a:t>
             </a:r>
             <a:r>
@@ -6087,19 +6087,11 @@
                       </a:r>
                       <a:r>
                         <a:rPr lang="ko-KR" altLang="en-US" dirty="0" err="1" smtClean="0"/>
-                        <a:t>서보모터</a:t>
-                      </a:r>
-                      <a:r>
-                        <a:rPr lang="ko-KR" altLang="en-US" dirty="0" err="1" smtClean="0"/>
-                        <a:t>를</a:t>
+                        <a:t>서보모터를</a:t>
                       </a:r>
                       <a:r>
                         <a:rPr lang="ko-KR" altLang="en-US" dirty="0" smtClean="0"/>
-                        <a:t> </a:t>
-                      </a:r>
-                      <a:r>
-                        <a:rPr lang="ko-KR" altLang="en-US" dirty="0" smtClean="0"/>
-                        <a:t>회전</a:t>
+                        <a:t> 회전</a:t>
                       </a:r>
                       <a:endParaRPr lang="ko-KR" altLang="en-US" dirty="0"/>
                     </a:p>
@@ -6595,11 +6587,7 @@
                       <a:pPr algn="ctr" latinLnBrk="1"/>
                       <a:r>
                         <a:rPr lang="en-US" altLang="ko-KR" dirty="0" smtClean="0"/>
-                        <a:t>.clear</a:t>
-                      </a:r>
-                      <a:r>
-                        <a:rPr lang="en-US" altLang="ko-KR" dirty="0" smtClean="0"/>
-                        <a:t>( )</a:t>
+                        <a:t>.clear( )</a:t>
                       </a:r>
                       <a:endParaRPr lang="ko-KR" altLang="en-US" dirty="0"/>
                     </a:p>
@@ -6618,11 +6606,7 @@
                       </a:r>
                       <a:r>
                         <a:rPr lang="ko-KR" altLang="en-US" dirty="0" smtClean="0"/>
-                        <a:t>화면 </a:t>
-                      </a:r>
-                      <a:r>
-                        <a:rPr lang="ko-KR" altLang="en-US" dirty="0" smtClean="0"/>
-                        <a:t>지우기</a:t>
+                        <a:t>화면 지우기</a:t>
                       </a:r>
                       <a:endParaRPr lang="ko-KR" altLang="en-US" dirty="0"/>
                     </a:p>
@@ -6678,11 +6662,7 @@
                       <a:pPr algn="ctr" latinLnBrk="1"/>
                       <a:r>
                         <a:rPr lang="en-US" altLang="ko-KR" dirty="0" smtClean="0"/>
-                        <a:t>.display</a:t>
-                      </a:r>
-                      <a:r>
-                        <a:rPr lang="en-US" altLang="ko-KR" dirty="0" smtClean="0"/>
-                        <a:t>( )</a:t>
+                        <a:t>.display( )</a:t>
                       </a:r>
                       <a:endParaRPr lang="ko-KR" altLang="en-US" dirty="0"/>
                     </a:p>
@@ -7101,11 +7081,7 @@
                       <a:pPr algn="ctr" latinLnBrk="1"/>
                       <a:r>
                         <a:rPr lang="ko-KR" altLang="en-US" dirty="0" smtClean="0"/>
-                        <a:t>와이파이 접속 </a:t>
-                      </a:r>
-                      <a:r>
-                        <a:rPr lang="ko-KR" altLang="en-US" dirty="0" smtClean="0"/>
-                        <a:t>시작</a:t>
+                        <a:t>와이파이 접속 시작</a:t>
                       </a:r>
                       <a:endParaRPr lang="ko-KR" altLang="en-US" dirty="0"/>
                     </a:p>
@@ -7211,11 +7187,7 @@
                       <a:pPr algn="ctr" latinLnBrk="1"/>
                       <a:r>
                         <a:rPr lang="en-US" altLang="ko-KR" dirty="0" smtClean="0"/>
-                        <a:t>.status</a:t>
-                      </a:r>
-                      <a:r>
-                        <a:rPr lang="en-US" altLang="ko-KR" dirty="0" smtClean="0"/>
-                        <a:t>( )</a:t>
+                        <a:t>.status( )</a:t>
                       </a:r>
                       <a:endParaRPr lang="ko-KR" altLang="en-US" dirty="0"/>
                     </a:p>
@@ -7230,11 +7202,7 @@
                       <a:pPr algn="ctr" latinLnBrk="1"/>
                       <a:r>
                         <a:rPr lang="ko-KR" altLang="en-US" dirty="0" smtClean="0"/>
-                        <a:t>와이파이 </a:t>
-                      </a:r>
-                      <a:r>
-                        <a:rPr lang="ko-KR" altLang="en-US" dirty="0" smtClean="0"/>
-                        <a:t>접속 상태</a:t>
+                        <a:t>와이파이 접속 상태</a:t>
                       </a:r>
                       <a:endParaRPr lang="ko-KR" altLang="en-US" dirty="0"/>
                     </a:p>
@@ -8150,11 +8118,7 @@
                       <a:pPr latinLnBrk="1"/>
                       <a:r>
                         <a:rPr lang="ko-KR" altLang="en-US" dirty="0" smtClean="0"/>
-                        <a:t>시간 제어 </a:t>
-                      </a:r>
-                      <a:r>
-                        <a:rPr lang="ko-KR" altLang="en-US" dirty="0" smtClean="0"/>
-                        <a:t>함수 제공</a:t>
+                        <a:t>시간 제어 함수 제공</a:t>
                       </a:r>
                       <a:endParaRPr lang="ko-KR" altLang="en-US" dirty="0"/>
                     </a:p>
@@ -8206,15 +8170,7 @@
                       <a:pPr latinLnBrk="1"/>
                       <a:r>
                         <a:rPr lang="ko-KR" altLang="en-US" dirty="0" smtClean="0"/>
-                        <a:t>보드 </a:t>
-                      </a:r>
-                      <a:r>
-                        <a:rPr lang="ko-KR" altLang="en-US" dirty="0" smtClean="0"/>
-                        <a:t>제어 </a:t>
-                      </a:r>
-                      <a:r>
-                        <a:rPr lang="ko-KR" altLang="en-US" dirty="0" smtClean="0"/>
-                        <a:t>함수 제공 </a:t>
+                        <a:t>보드 제어 함수 제공 </a:t>
                       </a:r>
                       <a:endParaRPr lang="ko-KR" altLang="en-US" dirty="0"/>
                     </a:p>
@@ -8266,15 +8222,7 @@
                       <a:pPr latinLnBrk="1"/>
                       <a:r>
                         <a:rPr lang="ko-KR" altLang="en-US" dirty="0" smtClean="0"/>
-                        <a:t>기본적인 </a:t>
-                      </a:r>
-                      <a:r>
-                        <a:rPr lang="ko-KR" altLang="en-US" dirty="0" smtClean="0"/>
-                        <a:t>수학 </a:t>
-                      </a:r>
-                      <a:r>
-                        <a:rPr lang="ko-KR" altLang="en-US" dirty="0" smtClean="0"/>
-                        <a:t>함수 제공</a:t>
+                        <a:t>기본적인 수학 함수 제공</a:t>
                       </a:r>
                       <a:endParaRPr lang="ko-KR" altLang="en-US" dirty="0"/>
                     </a:p>
@@ -8418,11 +8366,7 @@
                       </a:r>
                       <a:r>
                         <a:rPr lang="ko-KR" altLang="en-US" dirty="0" smtClean="0"/>
-                        <a:t> </a:t>
-                      </a:r>
-                      <a:r>
-                        <a:rPr lang="ko-KR" altLang="en-US" dirty="0" smtClean="0"/>
-                        <a:t>제어</a:t>
+                        <a:t> 제어</a:t>
                       </a:r>
                       <a:endParaRPr lang="ko-KR" altLang="en-US" dirty="0"/>
                     </a:p>
@@ -9883,18 +9827,7 @@
                           <a:ea typeface="+mn-ea"/>
                           <a:cs typeface="+mn-cs"/>
                         </a:rPr>
-                        <a:t>.value</a:t>
-                      </a:r>
-                      <a:r>
-                        <a:rPr lang="en-US" altLang="ko-KR" sz="1800" kern="1200" dirty="0" smtClean="0">
-                          <a:solidFill>
-                            <a:schemeClr val="dk1"/>
-                          </a:solidFill>
-                          <a:latin typeface="+mn-lt"/>
-                          <a:ea typeface="+mn-ea"/>
-                          <a:cs typeface="+mn-cs"/>
-                        </a:rPr>
-                        <a:t>(</a:t>
+                        <a:t>.value(</a:t>
                       </a:r>
                       <a:r>
                         <a:rPr lang="en-US" altLang="ko-KR" sz="1800" kern="1200" baseline="0" dirty="0" smtClean="0">
@@ -10546,31 +10479,7 @@
                           <a:ea typeface="+mn-ea"/>
                           <a:cs typeface="+mn-cs"/>
                         </a:rPr>
-                        <a:t>를 </a:t>
-                      </a:r>
-                      <a:r>
-                        <a:rPr lang="ko-KR" altLang="en-US" sz="1800" kern="1200" dirty="0" smtClean="0">
-                          <a:solidFill>
-                            <a:schemeClr val="dk1"/>
-                          </a:solidFill>
-                          <a:effectLst/>
-                          <a:latin typeface="+mn-lt"/>
-                          <a:ea typeface="+mn-ea"/>
-                          <a:cs typeface="+mn-cs"/>
-                        </a:rPr>
-                        <a:t>자연 로그로 </a:t>
-                      </a:r>
-                      <a:r>
-                        <a:rPr lang="ko-KR" altLang="en-US" sz="1800" kern="1200" dirty="0" smtClean="0">
-                          <a:solidFill>
-                            <a:schemeClr val="dk1"/>
-                          </a:solidFill>
-                          <a:effectLst/>
-                          <a:latin typeface="+mn-lt"/>
-                          <a:ea typeface="+mn-ea"/>
-                          <a:cs typeface="+mn-cs"/>
-                        </a:rPr>
-                        <a:t>반환 </a:t>
+                        <a:t>를 자연 로그로 반환 </a:t>
                       </a:r>
                       <a:endParaRPr lang="ko-KR" altLang="en-US" dirty="0"/>
                     </a:p>
@@ -10967,11 +10876,7 @@
                       <a:pPr algn="ctr" latinLnBrk="1"/>
                       <a:r>
                         <a:rPr lang="en-US" altLang="ko-KR" dirty="0" smtClean="0"/>
-                        <a:t>PinD2 = Pin(D2</a:t>
-                      </a:r>
-                      <a:r>
-                        <a:rPr lang="en-US" altLang="ko-KR" dirty="0" smtClean="0"/>
-                        <a:t>)</a:t>
+                        <a:t>PinD2 = Pin(D2)</a:t>
                       </a:r>
                       <a:endParaRPr lang="ko-KR" altLang="en-US" dirty="0"/>
                     </a:p>

</xml_diff>